<commit_message>
added GIF to resources page
To show the #DataDev search on YouTube
</commit_message>
<xml_diff>
--- a/Tableau JSAPI - 01 Introduction.pptx
+++ b/Tableau JSAPI - 01 Introduction.pptx
@@ -235,7 +235,7 @@
           <a:p>
             <a:fld id="{F06599F2-9818-4545-AFCB-68953993543F}" type="datetimeFigureOut">
               <a:rPr lang="en-US" smtClean="0"/>
-              <a:t>1/25/16</a:t>
+              <a:t>1/26/16</a:t>
             </a:fld>
             <a:endParaRPr lang="en-US"/>
           </a:p>
@@ -817,11 +817,7 @@
             </a:r>
             <a:r>
               <a:rPr lang="en-US" dirty="0" smtClean="0"/>
-              <a:t>for </a:t>
-            </a:r>
-            <a:r>
-              <a:rPr lang="en-US" dirty="0" smtClean="0"/>
-              <a:t>everything related to APIs and extensibility. You can find links to the JSAPI docs, examples, a hands</a:t>
+              <a:t>for everything related to APIs and extensibility. You can find links to the JSAPI docs, examples, a hands</a:t>
             </a:r>
             <a:r>
               <a:rPr lang="en-US" baseline="0" dirty="0" smtClean="0"/>
@@ -3605,11 +3601,7 @@
           <a:p>
             <a:r>
               <a:rPr lang="en-US" dirty="0" smtClean="0"/>
-              <a:t>JavaScript API I</a:t>
-            </a:r>
-            <a:r>
-              <a:rPr lang="en-US" dirty="0" smtClean="0"/>
-              <a:t>ntroduction</a:t>
+              <a:t>JavaScript API Introduction</a:t>
             </a:r>
             <a:endParaRPr lang="en-US" dirty="0"/>
           </a:p>
@@ -12983,8 +12975,19 @@
                 <a:ea typeface="Gill Sans MT" charset="0"/>
                 <a:cs typeface="Gill Sans MT" charset="0"/>
               </a:rPr>
-              <a:t>Community Forum</a:t>
-            </a:r>
+              <a:t>Community </a:t>
+            </a:r>
+            <a:r>
+              <a:rPr lang="en-US" sz="2800" dirty="0" smtClean="0">
+                <a:latin typeface="Gill Sans MT" charset="0"/>
+                <a:ea typeface="Gill Sans MT" charset="0"/>
+                <a:cs typeface="Gill Sans MT" charset="0"/>
+              </a:rPr>
+              <a:t>Forum</a:t>
+            </a:r>
+          </a:p>
+          <a:p>
+            <a:pPr lvl="1"/>
             <a:endParaRPr lang="en-US" sz="2800" dirty="0" smtClean="0">
               <a:latin typeface="Gill Sans MT" charset="0"/>
               <a:ea typeface="Gill Sans MT" charset="0"/>
@@ -13014,8 +13017,23 @@
                 <a:ea typeface="Gill Sans MT" charset="0"/>
                 <a:cs typeface="Gill Sans MT" charset="0"/>
               </a:rPr>
-              <a:t> YouTube</a:t>
-            </a:r>
+              <a:t> </a:t>
+            </a:r>
+            <a:r>
+              <a:rPr lang="en-US" sz="3200" dirty="0" smtClean="0">
+                <a:latin typeface="Gill Sans MT" charset="0"/>
+                <a:ea typeface="Gill Sans MT" charset="0"/>
+                <a:cs typeface="Gill Sans MT" charset="0"/>
+              </a:rPr>
+              <a:t>YouTube</a:t>
+            </a:r>
+          </a:p>
+          <a:p>
+            <a:endParaRPr lang="en-US" sz="3200" dirty="0" smtClean="0">
+              <a:latin typeface="Gill Sans MT" charset="0"/>
+              <a:ea typeface="Gill Sans MT" charset="0"/>
+              <a:cs typeface="Gill Sans MT" charset="0"/>
+            </a:endParaRPr>
           </a:p>
           <a:p>
             <a:r>
@@ -13069,6 +13087,36 @@
           </a:p>
         </p:txBody>
       </p:sp>
+      <p:pic>
+        <p:nvPicPr>
+          <p:cNvPr id="2" name="Picture 1"/>
+          <p:cNvPicPr>
+            <a:picLocks noChangeAspect="1"/>
+          </p:cNvPicPr>
+          <p:nvPr/>
+        </p:nvPicPr>
+        <p:blipFill>
+          <a:blip r:embed="rId5">
+            <a:extLst>
+              <a:ext uri="{28A0092B-C50C-407E-A947-70E740481C1C}">
+                <a14:useLocalDpi xmlns:a14="http://schemas.microsoft.com/office/drawing/2010/main" val="0"/>
+              </a:ext>
+            </a:extLst>
+          </a:blip>
+          <a:stretch>
+            <a:fillRect/>
+          </a:stretch>
+        </p:blipFill>
+        <p:spPr>
+          <a:xfrm>
+            <a:off x="6733308" y="2456623"/>
+            <a:ext cx="5262222" cy="2691329"/>
+          </a:xfrm>
+          <a:prstGeom prst="rect">
+            <a:avLst/>
+          </a:prstGeom>
+        </p:spPr>
+      </p:pic>
     </p:spTree>
     <p:extLst>
       <p:ext uri="{BB962C8B-B14F-4D97-AF65-F5344CB8AC3E}">
@@ -13143,71 +13191,14 @@
                                 </p:cTn>
                               </p:par>
                               <p:par>
-                                <p:cTn id="8" presetID="9" presetClass="emph" presetSubtype="0" nodeType="withEffect">
-                                  <p:stCondLst>
-                                    <p:cond delay="0"/>
-                                  </p:stCondLst>
-                                  <p:childTnLst>
-                                    <p:set>
-                                      <p:cBhvr rctx="PPT">
-                                        <p:cTn id="9" dur="indefinite"/>
-                                        <p:tgtEl>
-                                          <p:spTgt spid="3">
-                                            <p:txEl>
-                                              <p:pRg st="0" end="0"/>
-                                            </p:txEl>
-                                          </p:spTgt>
-                                        </p:tgtEl>
-                                        <p:attrNameLst>
-                                          <p:attrName>style.opacity</p:attrName>
-                                        </p:attrNameLst>
-                                      </p:cBhvr>
-                                      <p:to>
-                                        <p:strVal val="0.25"/>
-                                      </p:to>
-                                    </p:set>
-                                    <p:animEffect filter="image" prLst="opacity: 0.25">
-                                      <p:cBhvr rctx="IE">
-                                        <p:cTn id="10" dur="indefinite"/>
-                                        <p:tgtEl>
-                                          <p:spTgt spid="3">
-                                            <p:txEl>
-                                              <p:pRg st="0" end="0"/>
-                                            </p:txEl>
-                                          </p:spTgt>
-                                        </p:tgtEl>
-                                      </p:cBhvr>
-                                    </p:animEffect>
-                                  </p:childTnLst>
-                                </p:cTn>
-                              </p:par>
-                            </p:childTnLst>
-                          </p:cTn>
-                        </p:par>
-                      </p:childTnLst>
-                    </p:cTn>
-                  </p:par>
-                  <p:par>
-                    <p:cTn id="11" fill="hold">
-                      <p:stCondLst>
-                        <p:cond delay="indefinite"/>
-                      </p:stCondLst>
-                      <p:childTnLst>
-                        <p:par>
-                          <p:cTn id="12" fill="hold">
-                            <p:stCondLst>
-                              <p:cond delay="0"/>
-                            </p:stCondLst>
-                            <p:childTnLst>
-                              <p:par>
-                                <p:cTn id="13" presetID="10" presetClass="entr" presetSubtype="0" fill="hold" nodeType="clickEffect">
+                                <p:cTn id="8" presetID="10" presetClass="entr" presetSubtype="0" fill="hold" nodeType="withEffect">
                                   <p:stCondLst>
                                     <p:cond delay="0"/>
                                   </p:stCondLst>
                                   <p:childTnLst>
                                     <p:set>
                                       <p:cBhvr>
-                                        <p:cTn id="14" dur="1" fill="hold">
+                                        <p:cTn id="9" dur="1" fill="hold">
                                           <p:stCondLst>
                                             <p:cond delay="0"/>
                                           </p:stCondLst>
@@ -13229,7 +13220,7 @@
                                     </p:set>
                                     <p:animEffect transition="in" filter="fade">
                                       <p:cBhvr>
-                                        <p:cTn id="15" dur="500"/>
+                                        <p:cTn id="10" dur="500"/>
                                         <p:tgtEl>
                                           <p:spTgt spid="3">
                                             <p:txEl>
@@ -13242,33 +13233,15 @@
                                   </p:childTnLst>
                                 </p:cTn>
                               </p:par>
-                            </p:childTnLst>
-                          </p:cTn>
-                        </p:par>
-                      </p:childTnLst>
-                    </p:cTn>
-                  </p:par>
-                  <p:par>
-                    <p:cTn id="16" fill="hold">
-                      <p:stCondLst>
-                        <p:cond delay="indefinite"/>
-                      </p:stCondLst>
-                      <p:childTnLst>
-                        <p:par>
-                          <p:cTn id="17" fill="hold">
-                            <p:stCondLst>
-                              <p:cond delay="0"/>
-                            </p:stCondLst>
-                            <p:childTnLst>
                               <p:par>
-                                <p:cTn id="18" presetID="10" presetClass="entr" presetSubtype="0" fill="hold" nodeType="clickEffect">
+                                <p:cTn id="11" presetID="10" presetClass="entr" presetSubtype="0" fill="hold" nodeType="withEffect">
                                   <p:stCondLst>
                                     <p:cond delay="0"/>
                                   </p:stCondLst>
                                   <p:childTnLst>
                                     <p:set>
                                       <p:cBhvr>
-                                        <p:cTn id="19" dur="1" fill="hold">
+                                        <p:cTn id="12" dur="1" fill="hold">
                                           <p:stCondLst>
                                             <p:cond delay="0"/>
                                           </p:stCondLst>
@@ -13290,7 +13263,7 @@
                                     </p:set>
                                     <p:animEffect transition="in" filter="fade">
                                       <p:cBhvr>
-                                        <p:cTn id="20" dur="500"/>
+                                        <p:cTn id="13" dur="500"/>
                                         <p:tgtEl>
                                           <p:spTgt spid="3">
                                             <p:txEl>
@@ -13310,87 +13283,26 @@
                     </p:cTn>
                   </p:par>
                   <p:par>
-                    <p:cTn id="21" fill="hold">
+                    <p:cTn id="14" fill="hold">
                       <p:stCondLst>
                         <p:cond delay="indefinite"/>
                       </p:stCondLst>
                       <p:childTnLst>
                         <p:par>
-                          <p:cTn id="22" fill="hold">
+                          <p:cTn id="15" fill="hold">
                             <p:stCondLst>
                               <p:cond delay="0"/>
                             </p:stCondLst>
                             <p:childTnLst>
                               <p:par>
-                                <p:cTn id="23" presetID="10" presetClass="entr" presetSubtype="0" fill="hold" nodeType="clickEffect">
+                                <p:cTn id="16" presetID="10" presetClass="entr" presetSubtype="0" fill="hold" nodeType="clickEffect">
                                   <p:stCondLst>
                                     <p:cond delay="0"/>
                                   </p:stCondLst>
                                   <p:childTnLst>
                                     <p:set>
                                       <p:cBhvr>
-                                        <p:cTn id="24" dur="1" fill="hold">
-                                          <p:stCondLst>
-                                            <p:cond delay="0"/>
-                                          </p:stCondLst>
-                                        </p:cTn>
-                                        <p:tgtEl>
-                                          <p:spTgt spid="3">
-                                            <p:txEl>
-                                              <p:pRg st="4" end="4"/>
-                                            </p:txEl>
-                                          </p:spTgt>
-                                        </p:tgtEl>
-                                        <p:attrNameLst>
-                                          <p:attrName>style.visibility</p:attrName>
-                                        </p:attrNameLst>
-                                      </p:cBhvr>
-                                      <p:to>
-                                        <p:strVal val="visible"/>
-                                      </p:to>
-                                    </p:set>
-                                    <p:animEffect transition="in" filter="fade">
-                                      <p:cBhvr>
-                                        <p:cTn id="25" dur="500"/>
-                                        <p:tgtEl>
-                                          <p:spTgt spid="3">
-                                            <p:txEl>
-                                              <p:pRg st="4" end="4"/>
-                                            </p:txEl>
-                                          </p:spTgt>
-                                        </p:tgtEl>
-                                      </p:cBhvr>
-                                    </p:animEffect>
-                                  </p:childTnLst>
-                                </p:cTn>
-                              </p:par>
-                            </p:childTnLst>
-                          </p:cTn>
-                        </p:par>
-                      </p:childTnLst>
-                    </p:cTn>
-                  </p:par>
-                  <p:par>
-                    <p:cTn id="26" fill="hold">
-                      <p:stCondLst>
-                        <p:cond delay="indefinite"/>
-                      </p:stCondLst>
-                      <p:childTnLst>
-                        <p:par>
-                          <p:cTn id="27" fill="hold">
-                            <p:stCondLst>
-                              <p:cond delay="0"/>
-                            </p:stCondLst>
-                            <p:childTnLst>
-                              <p:par>
-                                <p:cTn id="28" presetID="10" presetClass="entr" presetSubtype="0" fill="hold" nodeType="clickEffect">
-                                  <p:stCondLst>
-                                    <p:cond delay="0"/>
-                                  </p:stCondLst>
-                                  <p:childTnLst>
-                                    <p:set>
-                                      <p:cBhvr>
-                                        <p:cTn id="29" dur="1" fill="hold">
+                                        <p:cTn id="17" dur="1" fill="hold">
                                           <p:stCondLst>
                                             <p:cond delay="0"/>
                                           </p:stCondLst>
@@ -13412,7 +13324,7 @@
                                     </p:set>
                                     <p:animEffect transition="in" filter="fade">
                                       <p:cBhvr>
-                                        <p:cTn id="30" dur="500"/>
+                                        <p:cTn id="18" dur="500"/>
                                         <p:tgtEl>
                                           <p:spTgt spid="3">
                                             <p:txEl>
@@ -13426,14 +13338,53 @@
                                 </p:cTn>
                               </p:par>
                               <p:par>
-                                <p:cTn id="31" presetID="9" presetClass="emph" presetSubtype="0" nodeType="withEffect">
+                                <p:cTn id="19" presetID="9" presetClass="emph" presetSubtype="0" nodeType="withEffect">
                                   <p:stCondLst>
                                     <p:cond delay="0"/>
                                   </p:stCondLst>
                                   <p:childTnLst>
                                     <p:set>
                                       <p:cBhvr rctx="PPT">
-                                        <p:cTn id="32" dur="indefinite"/>
+                                        <p:cTn id="20" dur="indefinite"/>
+                                        <p:tgtEl>
+                                          <p:spTgt spid="3">
+                                            <p:txEl>
+                                              <p:pRg st="0" end="0"/>
+                                            </p:txEl>
+                                          </p:spTgt>
+                                        </p:tgtEl>
+                                        <p:attrNameLst>
+                                          <p:attrName>style.opacity</p:attrName>
+                                        </p:attrNameLst>
+                                      </p:cBhvr>
+                                      <p:to>
+                                        <p:strVal val="0.25"/>
+                                      </p:to>
+                                    </p:set>
+                                    <p:animEffect filter="image" prLst="opacity: 0.25">
+                                      <p:cBhvr rctx="IE">
+                                        <p:cTn id="21" dur="indefinite"/>
+                                        <p:tgtEl>
+                                          <p:spTgt spid="3">
+                                            <p:txEl>
+                                              <p:pRg st="0" end="0"/>
+                                            </p:txEl>
+                                          </p:spTgt>
+                                        </p:tgtEl>
+                                      </p:cBhvr>
+                                    </p:animEffect>
+                                  </p:childTnLst>
+                                </p:cTn>
+                              </p:par>
+                              <p:par>
+                                <p:cTn id="22" presetID="9" presetClass="emph" presetSubtype="0" nodeType="withEffect">
+                                  <p:stCondLst>
+                                    <p:cond delay="0"/>
+                                  </p:stCondLst>
+                                  <p:childTnLst>
+                                    <p:set>
+                                      <p:cBhvr rctx="PPT">
+                                        <p:cTn id="23" dur="indefinite"/>
                                         <p:tgtEl>
                                           <p:spTgt spid="3">
                                             <p:txEl>
@@ -13451,7 +13402,7 @@
                                     </p:set>
                                     <p:animEffect filter="image" prLst="opacity: 0.25">
                                       <p:cBhvr rctx="IE">
-                                        <p:cTn id="33" dur="indefinite"/>
+                                        <p:cTn id="24" dur="indefinite"/>
                                         <p:tgtEl>
                                           <p:spTgt spid="3">
                                             <p:txEl>
@@ -13465,14 +13416,14 @@
                                 </p:cTn>
                               </p:par>
                               <p:par>
-                                <p:cTn id="34" presetID="9" presetClass="emph" presetSubtype="0" nodeType="withEffect">
+                                <p:cTn id="25" presetID="9" presetClass="emph" presetSubtype="0" nodeType="withEffect">
                                   <p:stCondLst>
                                     <p:cond delay="0"/>
                                   </p:stCondLst>
                                   <p:childTnLst>
                                     <p:set>
                                       <p:cBhvr rctx="PPT">
-                                        <p:cTn id="35" dur="indefinite"/>
+                                        <p:cTn id="26" dur="indefinite"/>
                                         <p:tgtEl>
                                           <p:spTgt spid="3">
                                             <p:txEl>
@@ -13490,7 +13441,7 @@
                                     </p:set>
                                     <p:animEffect filter="image" prLst="opacity: 0.25">
                                       <p:cBhvr rctx="IE">
-                                        <p:cTn id="36" dur="indefinite"/>
+                                        <p:cTn id="27" dur="indefinite"/>
                                         <p:tgtEl>
                                           <p:spTgt spid="3">
                                             <p:txEl>
@@ -13504,14 +13455,14 @@
                                 </p:cTn>
                               </p:par>
                               <p:par>
-                                <p:cTn id="37" presetID="9" presetClass="emph" presetSubtype="0" nodeType="withEffect">
+                                <p:cTn id="28" presetID="9" presetClass="emph" presetSubtype="0" nodeType="withEffect">
                                   <p:stCondLst>
                                     <p:cond delay="0"/>
                                   </p:stCondLst>
                                   <p:childTnLst>
                                     <p:set>
                                       <p:cBhvr rctx="PPT">
-                                        <p:cTn id="38" dur="indefinite"/>
+                                        <p:cTn id="29" dur="indefinite"/>
                                         <p:tgtEl>
                                           <p:spTgt spid="3">
                                             <p:txEl>
@@ -13529,7 +13480,7 @@
                                     </p:set>
                                     <p:animEffect filter="image" prLst="opacity: 0.25">
                                       <p:cBhvr rctx="IE">
-                                        <p:cTn id="39" dur="indefinite"/>
+                                        <p:cTn id="30" dur="indefinite"/>
                                         <p:tgtEl>
                                           <p:spTgt spid="3">
                                             <p:txEl>
@@ -13543,36 +13494,93 @@
                                 </p:cTn>
                               </p:par>
                               <p:par>
-                                <p:cTn id="40" presetID="9" presetClass="emph" presetSubtype="0" nodeType="withEffect">
+                                <p:cTn id="31" presetID="10" presetClass="entr" presetSubtype="0" fill="hold" nodeType="withEffect">
                                   <p:stCondLst>
                                     <p:cond delay="0"/>
                                   </p:stCondLst>
                                   <p:childTnLst>
                                     <p:set>
-                                      <p:cBhvr rctx="PPT">
-                                        <p:cTn id="41" dur="indefinite"/>
+                                      <p:cBhvr>
+                                        <p:cTn id="32" dur="1" fill="hold">
+                                          <p:stCondLst>
+                                            <p:cond delay="0"/>
+                                          </p:stCondLst>
+                                        </p:cTn>
+                                        <p:tgtEl>
+                                          <p:spTgt spid="2"/>
+                                        </p:tgtEl>
+                                        <p:attrNameLst>
+                                          <p:attrName>style.visibility</p:attrName>
+                                        </p:attrNameLst>
+                                      </p:cBhvr>
+                                      <p:to>
+                                        <p:strVal val="visible"/>
+                                      </p:to>
+                                    </p:set>
+                                    <p:animEffect transition="in" filter="fade">
+                                      <p:cBhvr>
+                                        <p:cTn id="33" dur="1000"/>
+                                        <p:tgtEl>
+                                          <p:spTgt spid="2"/>
+                                        </p:tgtEl>
+                                      </p:cBhvr>
+                                    </p:animEffect>
+                                  </p:childTnLst>
+                                </p:cTn>
+                              </p:par>
+                            </p:childTnLst>
+                          </p:cTn>
+                        </p:par>
+                      </p:childTnLst>
+                    </p:cTn>
+                  </p:par>
+                  <p:par>
+                    <p:cTn id="34" fill="hold">
+                      <p:stCondLst>
+                        <p:cond delay="indefinite"/>
+                      </p:stCondLst>
+                      <p:childTnLst>
+                        <p:par>
+                          <p:cTn id="35" fill="hold">
+                            <p:stCondLst>
+                              <p:cond delay="0"/>
+                            </p:stCondLst>
+                            <p:childTnLst>
+                              <p:par>
+                                <p:cTn id="36" presetID="10" presetClass="entr" presetSubtype="0" fill="hold" nodeType="clickEffect">
+                                  <p:stCondLst>
+                                    <p:cond delay="0"/>
+                                  </p:stCondLst>
+                                  <p:childTnLst>
+                                    <p:set>
+                                      <p:cBhvr>
+                                        <p:cTn id="37" dur="1" fill="hold">
+                                          <p:stCondLst>
+                                            <p:cond delay="0"/>
+                                          </p:stCondLst>
+                                        </p:cTn>
                                         <p:tgtEl>
                                           <p:spTgt spid="3">
                                             <p:txEl>
-                                              <p:pRg st="4" end="4"/>
+                                              <p:pRg st="7" end="7"/>
                                             </p:txEl>
                                           </p:spTgt>
                                         </p:tgtEl>
                                         <p:attrNameLst>
-                                          <p:attrName>style.opacity</p:attrName>
+                                          <p:attrName>style.visibility</p:attrName>
                                         </p:attrNameLst>
                                       </p:cBhvr>
                                       <p:to>
-                                        <p:strVal val="0.25"/>
+                                        <p:strVal val="visible"/>
                                       </p:to>
                                     </p:set>
-                                    <p:animEffect filter="image" prLst="opacity: 0.25">
-                                      <p:cBhvr rctx="IE">
-                                        <p:cTn id="42" dur="indefinite"/>
+                                    <p:animEffect transition="in" filter="fade">
+                                      <p:cBhvr>
+                                        <p:cTn id="38" dur="500"/>
                                         <p:tgtEl>
                                           <p:spTgt spid="3">
                                             <p:txEl>
-                                              <p:pRg st="4" end="4"/>
+                                              <p:pRg st="7" end="7"/>
                                             </p:txEl>
                                           </p:spTgt>
                                         </p:tgtEl>
@@ -13582,14 +13590,14 @@
                                 </p:cTn>
                               </p:par>
                               <p:par>
-                                <p:cTn id="43" presetID="9" presetClass="emph" presetSubtype="0" nodeType="withEffect">
+                                <p:cTn id="39" presetID="9" presetClass="emph" presetSubtype="0" nodeType="withEffect">
                                   <p:stCondLst>
                                     <p:cond delay="0"/>
                                   </p:stCondLst>
                                   <p:childTnLst>
                                     <p:set>
                                       <p:cBhvr rctx="PPT">
-                                        <p:cTn id="44" dur="indefinite"/>
+                                        <p:cTn id="40" dur="indefinite"/>
                                         <p:tgtEl>
                                           <p:spTgt spid="3">
                                             <p:txEl>
@@ -13607,13 +13615,44 @@
                                     </p:set>
                                     <p:animEffect filter="image" prLst="opacity: 0.25">
                                       <p:cBhvr rctx="IE">
-                                        <p:cTn id="45" dur="indefinite"/>
+                                        <p:cTn id="41" dur="indefinite"/>
                                         <p:tgtEl>
                                           <p:spTgt spid="3">
                                             <p:txEl>
                                               <p:pRg st="5" end="5"/>
                                             </p:txEl>
                                           </p:spTgt>
+                                        </p:tgtEl>
+                                      </p:cBhvr>
+                                    </p:animEffect>
+                                  </p:childTnLst>
+                                </p:cTn>
+                              </p:par>
+                              <p:par>
+                                <p:cTn id="42" presetID="9" presetClass="emph" presetSubtype="0" nodeType="withEffect">
+                                  <p:stCondLst>
+                                    <p:cond delay="0"/>
+                                  </p:stCondLst>
+                                  <p:childTnLst>
+                                    <p:set>
+                                      <p:cBhvr rctx="PPT">
+                                        <p:cTn id="43" dur="indefinite"/>
+                                        <p:tgtEl>
+                                          <p:spTgt spid="2"/>
+                                        </p:tgtEl>
+                                        <p:attrNameLst>
+                                          <p:attrName>style.opacity</p:attrName>
+                                        </p:attrNameLst>
+                                      </p:cBhvr>
+                                      <p:to>
+                                        <p:strVal val="0.5"/>
+                                      </p:to>
+                                    </p:set>
+                                    <p:animEffect filter="image" prLst="opacity: 0.5">
+                                      <p:cBhvr rctx="IE">
+                                        <p:cTn id="44" dur="indefinite"/>
+                                        <p:tgtEl>
+                                          <p:spTgt spid="2"/>
                                         </p:tgtEl>
                                       </p:cBhvr>
                                     </p:animEffect>

</xml_diff>

<commit_message>
Adding slide deck for Tutorial Walk-through
</commit_message>
<xml_diff>
--- a/Tableau JSAPI - 01 Introduction.pptx
+++ b/Tableau JSAPI - 01 Introduction.pptx
@@ -4520,10 +4520,10 @@
                                         </p:attrNameLst>
                                       </p:cBhvr>
                                       <p:to>
-                                        <p:strVal val="0.5"/>
+                                        <p:strVal val="0.25"/>
                                       </p:to>
                                     </p:set>
-                                    <p:animEffect filter="image" prLst="opacity: 0.5">
+                                    <p:animEffect filter="image" prLst="opacity: 0.25">
                                       <p:cBhvr rctx="IE">
                                         <p:cTn id="17" dur="indefinite"/>
                                         <p:tgtEl>
@@ -4551,10 +4551,10 @@
                                         </p:attrNameLst>
                                       </p:cBhvr>
                                       <p:to>
-                                        <p:strVal val="0.5"/>
+                                        <p:strVal val="0.25"/>
                                       </p:to>
                                     </p:set>
-                                    <p:animEffect filter="image" prLst="opacity: 0.5">
+                                    <p:animEffect filter="image" prLst="opacity: 0.25">
                                       <p:cBhvr rctx="IE">
                                         <p:cTn id="20" dur="indefinite"/>
                                         <p:tgtEl>
@@ -4582,10 +4582,10 @@
                                         </p:attrNameLst>
                                       </p:cBhvr>
                                       <p:to>
-                                        <p:strVal val="0.5"/>
+                                        <p:strVal val="0.25"/>
                                       </p:to>
                                     </p:set>
-                                    <p:animEffect filter="image" prLst="opacity: 0.5">
+                                    <p:animEffect filter="image" prLst="opacity: 0.25">
                                       <p:cBhvr rctx="IE">
                                         <p:cTn id="23" dur="indefinite"/>
                                         <p:tgtEl>
@@ -13682,10 +13682,10 @@
                                         </p:attrNameLst>
                                       </p:cBhvr>
                                       <p:to>
-                                        <p:strVal val="0.5"/>
+                                        <p:strVal val="0.25"/>
                                       </p:to>
                                     </p:set>
-                                    <p:animEffect filter="image" prLst="opacity: 0.5">
+                                    <p:animEffect filter="image" prLst="opacity: 0.25">
                                       <p:cBhvr rctx="IE">
                                         <p:cTn id="44" dur="indefinite"/>
                                         <p:tgtEl>

</xml_diff>

<commit_message>
Updated series animations and embedOnly screenshot
Animations work a bit better now in the series overview slides. New
version of embedOnly screenshot added (also added the source file).
Incorporated Michael’s changes.
</commit_message>
<xml_diff>
--- a/Tableau JSAPI - 01 Introduction.pptx
+++ b/Tableau JSAPI - 01 Introduction.pptx
@@ -235,7 +235,7 @@
           <a:p>
             <a:fld id="{F06599F2-9818-4545-AFCB-68953993543F}" type="datetimeFigureOut">
               <a:rPr lang="en-US" smtClean="0"/>
-              <a:t>1/26/16</a:t>
+              <a:t>1/27/16</a:t>
             </a:fld>
             <a:endParaRPr lang="en-US"/>
           </a:p>
@@ -631,6 +631,107 @@
           <a:bodyPr/>
           <a:lstStyle/>
           <a:p>
+            <a:pPr marL="228600" marR="0" lvl="0" indent="-228600" algn="l" defTabSz="914400" rtl="0" eaLnBrk="1" fontAlgn="auto" latinLnBrk="0" hangingPunct="1">
+              <a:lnSpc>
+                <a:spcPct val="100000"/>
+              </a:lnSpc>
+              <a:spcBef>
+                <a:spcPts val="0"/>
+              </a:spcBef>
+              <a:spcAft>
+                <a:spcPts val="0"/>
+              </a:spcAft>
+              <a:buClrTx/>
+              <a:buSzTx/>
+              <a:buFontTx/>
+              <a:buNone/>
+              <a:tabLst/>
+              <a:defRPr/>
+            </a:pPr>
+            <a:endParaRPr lang="en-US" dirty="0"/>
+          </a:p>
+        </p:txBody>
+      </p:sp>
+      <p:sp>
+        <p:nvSpPr>
+          <p:cNvPr id="4" name="Slide Number Placeholder 3"/>
+          <p:cNvSpPr>
+            <a:spLocks noGrp="1"/>
+          </p:cNvSpPr>
+          <p:nvPr>
+            <p:ph type="sldNum" sz="quarter" idx="10"/>
+          </p:nvPr>
+        </p:nvSpPr>
+        <p:spPr/>
+        <p:txBody>
+          <a:bodyPr/>
+          <a:lstStyle/>
+          <a:p>
+            <a:fld id="{914353E8-10D2-E241-A23D-E7ACCCF5E6F2}" type="slidenum">
+              <a:rPr lang="en-US" smtClean="0"/>
+              <a:t>2</a:t>
+            </a:fld>
+            <a:endParaRPr lang="en-US"/>
+          </a:p>
+        </p:txBody>
+      </p:sp>
+    </p:spTree>
+    <p:extLst>
+      <p:ext uri="{BB962C8B-B14F-4D97-AF65-F5344CB8AC3E}">
+        <p14:creationId xmlns:p14="http://schemas.microsoft.com/office/powerpoint/2010/main" val="2119830223"/>
+      </p:ext>
+    </p:extLst>
+  </p:cSld>
+  <p:clrMapOvr>
+    <a:masterClrMapping/>
+  </p:clrMapOvr>
+</p:notes>
+</file>
+
+<file path=ppt/notesSlides/notesSlide3.xml><?xml version="1.0" encoding="utf-8"?>
+<p:notes xmlns:a="http://schemas.openxmlformats.org/drawingml/2006/main" xmlns:r="http://schemas.openxmlformats.org/officeDocument/2006/relationships" xmlns:p="http://schemas.openxmlformats.org/presentationml/2006/main">
+  <p:cSld>
+    <p:spTree>
+      <p:nvGrpSpPr>
+        <p:cNvPr id="1" name=""/>
+        <p:cNvGrpSpPr/>
+        <p:nvPr/>
+      </p:nvGrpSpPr>
+      <p:grpSpPr>
+        <a:xfrm>
+          <a:off x="0" y="0"/>
+          <a:ext cx="0" cy="0"/>
+          <a:chOff x="0" y="0"/>
+          <a:chExt cx="0" cy="0"/>
+        </a:xfrm>
+      </p:grpSpPr>
+      <p:sp>
+        <p:nvSpPr>
+          <p:cNvPr id="2" name="Slide Image Placeholder 1"/>
+          <p:cNvSpPr>
+            <a:spLocks noGrp="1" noRot="1" noChangeAspect="1"/>
+          </p:cNvSpPr>
+          <p:nvPr>
+            <p:ph type="sldImg"/>
+          </p:nvPr>
+        </p:nvSpPr>
+        <p:spPr/>
+      </p:sp>
+      <p:sp>
+        <p:nvSpPr>
+          <p:cNvPr id="3" name="Notes Placeholder 2"/>
+          <p:cNvSpPr>
+            <a:spLocks noGrp="1"/>
+          </p:cNvSpPr>
+          <p:nvPr>
+            <p:ph type="body" idx="1"/>
+          </p:nvPr>
+        </p:nvSpPr>
+        <p:spPr/>
+        <p:txBody>
+          <a:bodyPr/>
+          <a:lstStyle/>
+          <a:p>
             <a:endParaRPr lang="en-US" dirty="0"/>
           </a:p>
         </p:txBody>
@@ -671,7 +772,7 @@
 </p:notes>
 </file>
 
-<file path=ppt/notesSlides/notesSlide3.xml><?xml version="1.0" encoding="utf-8"?>
+<file path=ppt/notesSlides/notesSlide4.xml><?xml version="1.0" encoding="utf-8"?>
 <p:notes xmlns:a="http://schemas.openxmlformats.org/drawingml/2006/main" xmlns:r="http://schemas.openxmlformats.org/officeDocument/2006/relationships" xmlns:p="http://schemas.openxmlformats.org/presentationml/2006/main">
   <p:cSld>
     <p:spTree>
@@ -755,7 +856,7 @@
 </p:notes>
 </file>
 
-<file path=ppt/notesSlides/notesSlide4.xml><?xml version="1.0" encoding="utf-8"?>
+<file path=ppt/notesSlides/notesSlide5.xml><?xml version="1.0" encoding="utf-8"?>
 <p:notes xmlns:a="http://schemas.openxmlformats.org/drawingml/2006/main" xmlns:r="http://schemas.openxmlformats.org/officeDocument/2006/relationships" xmlns:p="http://schemas.openxmlformats.org/presentationml/2006/main">
   <p:cSld>
     <p:spTree>
@@ -4288,7 +4389,7 @@
                 <a:latin typeface="Gill Sans MT" charset="0"/>
                 <a:ea typeface="Gill Sans MT" charset="0"/>
                 <a:cs typeface="Gill Sans MT" charset="0"/>
-                <a:hlinkClick r:id="rId2"/>
+                <a:hlinkClick r:id="rId3"/>
               </a:rPr>
               <a:t>http</a:t>
             </a:r>
@@ -4302,7 +4403,7 @@
                 <a:latin typeface="Gill Sans MT" charset="0"/>
                 <a:ea typeface="Gill Sans MT" charset="0"/>
                 <a:cs typeface="Gill Sans MT" charset="0"/>
-                <a:hlinkClick r:id="rId2"/>
+                <a:hlinkClick r:id="rId3"/>
               </a:rPr>
               <a:t>://</a:t>
             </a:r>
@@ -4316,7 +4417,7 @@
                 <a:latin typeface="Gill Sans MT" charset="0"/>
                 <a:ea typeface="Gill Sans MT" charset="0"/>
                 <a:cs typeface="Gill Sans MT" charset="0"/>
-                <a:hlinkClick r:id="rId2"/>
+                <a:hlinkClick r:id="rId3"/>
               </a:rPr>
               <a:t>github.com/tableau/JSAPIVideos</a:t>
             </a:r>
@@ -4387,131 +4488,14 @@
                             </p:stCondLst>
                             <p:childTnLst>
                               <p:par>
-                                <p:cTn id="5" presetID="1" presetClass="entr" presetSubtype="0" fill="hold" nodeType="clickEffect">
-                                  <p:stCondLst>
-                                    <p:cond delay="0"/>
-                                  </p:stCondLst>
-                                  <p:childTnLst>
-                                    <p:set>
-                                      <p:cBhvr>
-                                        <p:cTn id="6" dur="1" fill="hold">
-                                          <p:stCondLst>
-                                            <p:cond delay="0"/>
-                                          </p:stCondLst>
-                                        </p:cTn>
-                                        <p:tgtEl>
-                                          <p:spTgt spid="20"/>
-                                        </p:tgtEl>
-                                        <p:attrNameLst>
-                                          <p:attrName>style.visibility</p:attrName>
-                                        </p:attrNameLst>
-                                      </p:cBhvr>
-                                      <p:to>
-                                        <p:strVal val="visible"/>
-                                      </p:to>
-                                    </p:set>
-                                  </p:childTnLst>
-                                </p:cTn>
-                              </p:par>
-                            </p:childTnLst>
-                          </p:cTn>
-                        </p:par>
-                      </p:childTnLst>
-                    </p:cTn>
-                  </p:par>
-                  <p:par>
-                    <p:cTn id="7" fill="hold">
-                      <p:stCondLst>
-                        <p:cond delay="indefinite"/>
-                      </p:stCondLst>
-                      <p:childTnLst>
-                        <p:par>
-                          <p:cTn id="8" fill="hold">
-                            <p:stCondLst>
-                              <p:cond delay="0"/>
-                            </p:stCondLst>
-                            <p:childTnLst>
-                              <p:par>
-                                <p:cTn id="9" presetID="1" presetClass="entr" presetSubtype="0" fill="hold" nodeType="clickEffect">
-                                  <p:stCondLst>
-                                    <p:cond delay="0"/>
-                                  </p:stCondLst>
-                                  <p:childTnLst>
-                                    <p:set>
-                                      <p:cBhvr>
-                                        <p:cTn id="10" dur="1" fill="hold">
-                                          <p:stCondLst>
-                                            <p:cond delay="0"/>
-                                          </p:stCondLst>
-                                        </p:cTn>
-                                        <p:tgtEl>
-                                          <p:spTgt spid="21"/>
-                                        </p:tgtEl>
-                                        <p:attrNameLst>
-                                          <p:attrName>style.visibility</p:attrName>
-                                        </p:attrNameLst>
-                                      </p:cBhvr>
-                                      <p:to>
-                                        <p:strVal val="visible"/>
-                                      </p:to>
-                                    </p:set>
-                                  </p:childTnLst>
-                                </p:cTn>
-                              </p:par>
-                              <p:par>
-                                <p:cTn id="11" presetID="1" presetClass="entr" presetSubtype="0" fill="hold" nodeType="withEffect">
-                                  <p:stCondLst>
-                                    <p:cond delay="0"/>
-                                  </p:stCondLst>
-                                  <p:childTnLst>
-                                    <p:set>
-                                      <p:cBhvr>
-                                        <p:cTn id="12" dur="1" fill="hold">
-                                          <p:stCondLst>
-                                            <p:cond delay="0"/>
-                                          </p:stCondLst>
-                                        </p:cTn>
-                                        <p:tgtEl>
-                                          <p:spTgt spid="22"/>
-                                        </p:tgtEl>
-                                        <p:attrNameLst>
-                                          <p:attrName>style.visibility</p:attrName>
-                                        </p:attrNameLst>
-                                      </p:cBhvr>
-                                      <p:to>
-                                        <p:strVal val="visible"/>
-                                      </p:to>
-                                    </p:set>
-                                  </p:childTnLst>
-                                </p:cTn>
-                              </p:par>
-                            </p:childTnLst>
-                          </p:cTn>
-                        </p:par>
-                      </p:childTnLst>
-                    </p:cTn>
-                  </p:par>
-                  <p:par>
-                    <p:cTn id="13" fill="hold">
-                      <p:stCondLst>
-                        <p:cond delay="indefinite"/>
-                      </p:stCondLst>
-                      <p:childTnLst>
-                        <p:par>
-                          <p:cTn id="14" fill="hold">
-                            <p:stCondLst>
-                              <p:cond delay="0"/>
-                            </p:stCondLst>
-                            <p:childTnLst>
-                              <p:par>
-                                <p:cTn id="15" presetID="9" presetClass="emph" presetSubtype="0" nodeType="clickEffect">
+                                <p:cTn id="5" presetID="9" presetClass="emph" presetSubtype="0" nodeType="clickEffect">
                                   <p:stCondLst>
                                     <p:cond delay="0"/>
                                   </p:stCondLst>
                                   <p:childTnLst>
                                     <p:set>
                                       <p:cBhvr rctx="PPT">
-                                        <p:cTn id="16" dur="indefinite"/>
+                                        <p:cTn id="6" dur="indefinite"/>
                                         <p:tgtEl>
                                           <p:spTgt spid="20"/>
                                         </p:tgtEl>
@@ -4525,7 +4509,7 @@
                                     </p:set>
                                     <p:animEffect filter="image" prLst="opacity: 0.25">
                                       <p:cBhvr rctx="IE">
-                                        <p:cTn id="17" dur="indefinite"/>
+                                        <p:cTn id="7" dur="indefinite"/>
                                         <p:tgtEl>
                                           <p:spTgt spid="20"/>
                                         </p:tgtEl>
@@ -4535,14 +4519,14 @@
                                 </p:cTn>
                               </p:par>
                               <p:par>
-                                <p:cTn id="18" presetID="9" presetClass="emph" presetSubtype="0" nodeType="withEffect">
+                                <p:cTn id="8" presetID="9" presetClass="emph" presetSubtype="0" nodeType="withEffect">
                                   <p:stCondLst>
                                     <p:cond delay="0"/>
                                   </p:stCondLst>
                                   <p:childTnLst>
                                     <p:set>
                                       <p:cBhvr rctx="PPT">
-                                        <p:cTn id="19" dur="indefinite"/>
+                                        <p:cTn id="9" dur="indefinite"/>
                                         <p:tgtEl>
                                           <p:spTgt spid="22"/>
                                         </p:tgtEl>
@@ -4556,7 +4540,7 @@
                                     </p:set>
                                     <p:animEffect filter="image" prLst="opacity: 0.25">
                                       <p:cBhvr rctx="IE">
-                                        <p:cTn id="20" dur="indefinite"/>
+                                        <p:cTn id="10" dur="indefinite"/>
                                         <p:tgtEl>
                                           <p:spTgt spid="22"/>
                                         </p:tgtEl>
@@ -4566,14 +4550,14 @@
                                 </p:cTn>
                               </p:par>
                               <p:par>
-                                <p:cTn id="21" presetID="9" presetClass="emph" presetSubtype="0" nodeType="withEffect">
+                                <p:cTn id="11" presetID="9" presetClass="emph" presetSubtype="0" nodeType="withEffect">
                                   <p:stCondLst>
                                     <p:cond delay="0"/>
                                   </p:stCondLst>
                                   <p:childTnLst>
                                     <p:set>
                                       <p:cBhvr rctx="PPT">
-                                        <p:cTn id="22" dur="indefinite"/>
+                                        <p:cTn id="12" dur="indefinite"/>
                                         <p:tgtEl>
                                           <p:spTgt spid="21"/>
                                         </p:tgtEl>
@@ -4587,7 +4571,7 @@
                                     </p:set>
                                     <p:animEffect filter="image" prLst="opacity: 0.25">
                                       <p:cBhvr rctx="IE">
-                                        <p:cTn id="23" dur="indefinite"/>
+                                        <p:cTn id="13" dur="indefinite"/>
                                         <p:tgtEl>
                                           <p:spTgt spid="21"/>
                                         </p:tgtEl>
@@ -4596,15 +4580,33 @@
                                   </p:childTnLst>
                                 </p:cTn>
                               </p:par>
+                            </p:childTnLst>
+                          </p:cTn>
+                        </p:par>
+                      </p:childTnLst>
+                    </p:cTn>
+                  </p:par>
+                  <p:par>
+                    <p:cTn id="14" fill="hold">
+                      <p:stCondLst>
+                        <p:cond delay="indefinite"/>
+                      </p:stCondLst>
+                      <p:childTnLst>
+                        <p:par>
+                          <p:cTn id="15" fill="hold">
+                            <p:stCondLst>
+                              <p:cond delay="0"/>
+                            </p:stCondLst>
+                            <p:childTnLst>
                               <p:par>
-                                <p:cTn id="24" presetID="9" presetClass="entr" presetSubtype="0" fill="hold" grpId="0" nodeType="withEffect">
+                                <p:cTn id="16" presetID="9" presetClass="entr" presetSubtype="0" fill="hold" grpId="0" nodeType="clickEffect">
                                   <p:stCondLst>
                                     <p:cond delay="0"/>
                                   </p:stCondLst>
                                   <p:childTnLst>
                                     <p:set>
                                       <p:cBhvr>
-                                        <p:cTn id="25" dur="1" fill="hold">
+                                        <p:cTn id="17" dur="1" fill="hold">
                                           <p:stCondLst>
                                             <p:cond delay="0"/>
                                           </p:stCondLst>
@@ -4622,7 +4624,7 @@
                                     </p:set>
                                     <p:animEffect transition="in" filter="dissolve">
                                       <p:cBhvr>
-                                        <p:cTn id="26" dur="500"/>
+                                        <p:cTn id="18" dur="500"/>
                                         <p:tgtEl>
                                           <p:spTgt spid="33"/>
                                         </p:tgtEl>
@@ -8678,29 +8680,6 @@
           </a:prstGeom>
         </p:spPr>
       </p:pic>
-      <p:pic>
-        <p:nvPicPr>
-          <p:cNvPr id="21" name="Picture 20"/>
-          <p:cNvPicPr>
-            <a:picLocks noChangeAspect="1"/>
-          </p:cNvPicPr>
-          <p:nvPr/>
-        </p:nvPicPr>
-        <p:blipFill rotWithShape="1">
-          <a:blip r:embed="rId4"/>
-          <a:srcRect t="6617" b="66124"/>
-          <a:stretch/>
-        </p:blipFill>
-        <p:spPr>
-          <a:xfrm>
-            <a:off x="2615606" y="2244436"/>
-            <a:ext cx="5515375" cy="1128156"/>
-          </a:xfrm>
-          <a:prstGeom prst="rect">
-            <a:avLst/>
-          </a:prstGeom>
-        </p:spPr>
-      </p:pic>
       <p:sp>
         <p:nvSpPr>
           <p:cNvPr id="15" name="Title 14"/>
@@ -8724,6 +8703,30 @@
           </a:p>
         </p:txBody>
       </p:sp>
+      <p:pic>
+        <p:nvPicPr>
+          <p:cNvPr id="3" name="Picture 2"/>
+          <p:cNvPicPr>
+            <a:picLocks noChangeAspect="1"/>
+          </p:cNvPicPr>
+          <p:nvPr/>
+        </p:nvPicPr>
+        <p:blipFill>
+          <a:blip r:embed="rId4"/>
+          <a:stretch>
+            <a:fillRect/>
+          </a:stretch>
+        </p:blipFill>
+        <p:spPr>
+          <a:xfrm>
+            <a:off x="0" y="1461831"/>
+            <a:ext cx="12192000" cy="3934337"/>
+          </a:xfrm>
+          <a:prstGeom prst="rect">
+            <a:avLst/>
+          </a:prstGeom>
+        </p:spPr>
+      </p:pic>
     </p:spTree>
     <p:extLst>
       <p:ext uri="{BB962C8B-B14F-4D97-AF65-F5344CB8AC3E}">
@@ -9750,7 +9753,7 @@
                                           </p:stCondLst>
                                         </p:cTn>
                                         <p:tgtEl>
-                                          <p:spTgt spid="21"/>
+                                          <p:spTgt spid="3"/>
                                         </p:tgtEl>
                                         <p:attrNameLst>
                                           <p:attrName>style.visibility</p:attrName>
@@ -9764,7 +9767,7 @@
                                       <p:cBhvr>
                                         <p:cTn id="93" dur="500"/>
                                         <p:tgtEl>
-                                          <p:spTgt spid="21"/>
+                                          <p:spTgt spid="3"/>
                                         </p:tgtEl>
                                       </p:cBhvr>
                                     </p:animEffect>
@@ -9835,7 +9838,7 @@
                                       <p:cBhvr>
                                         <p:cTn id="100" dur="500"/>
                                         <p:tgtEl>
-                                          <p:spTgt spid="21"/>
+                                          <p:spTgt spid="3"/>
                                         </p:tgtEl>
                                       </p:cBhvr>
                                     </p:animEffect>
@@ -9847,7 +9850,7 @@
                                           </p:stCondLst>
                                         </p:cTn>
                                         <p:tgtEl>
-                                          <p:spTgt spid="21"/>
+                                          <p:spTgt spid="3"/>
                                         </p:tgtEl>
                                         <p:attrNameLst>
                                           <p:attrName>style.visibility</p:attrName>

</xml_diff>